<commit_message>
minor fixes in pipeline
</commit_message>
<xml_diff>
--- a/backend/cleansed_files/cleansed_File_014.pptx
+++ b/backend/cleansed_files/cleansed_File_014.pptx
@@ -3416,10 +3416,8 @@
           <a:lstStyle/>
           <a:p>
             <a:r>
-              <a:rPr lang="en-US"/>
-              <a:t>Network Topology Diagram</a:t>
-            </a:r>
-            <a:endParaRPr lang="en-IN"/>
+              <a:t>[REDACTED]ram</a:t>
+            </a:r>
           </a:p>
         </p:txBody>
       </p:sp>
@@ -3445,10 +3443,8 @@
           <a:lstStyle/>
           <a:p>
             <a:r>
-              <a:rPr lang="en-US"/>
               <a:t>Internal Team Reviews and Updates</a:t>
             </a:r>
-            <a:endParaRPr lang="en-IN"/>
           </a:p>
         </p:txBody>
       </p:sp>
@@ -3625,10 +3621,8 @@
           <a:lstStyle/>
           <a:p>
             <a:r>
-              <a:rPr lang="en-US"/>
               <a:t>Revision History</a:t>
             </a:r>
-            <a:endParaRPr lang="en-IN"/>
           </a:p>
         </p:txBody>
       </p:sp>

</xml_diff>

<commit_message>
code optimised and cleaned
</commit_message>
<xml_diff>
--- a/backend/cleansed_files/cleansed_File_014.pptx
+++ b/backend/cleansed_files/cleansed_File_014.pptx
@@ -3416,7 +3416,7 @@
           <a:lstStyle/>
           <a:p>
             <a:r>
-              <a:t>[REDACTED]ram</a:t>
+              <a:t>Network [REDACTED] Diagram</a:t>
             </a:r>
           </a:p>
         </p:txBody>
@@ -3443,8 +3443,10 @@
           <a:lstStyle/>
           <a:p>
             <a:r>
+              <a:rPr lang="en-US"/>
               <a:t>Internal Team Reviews and Updates</a:t>
             </a:r>
+            <a:endParaRPr lang="en-IN"/>
           </a:p>
         </p:txBody>
       </p:sp>
@@ -3621,8 +3623,10 @@
           <a:lstStyle/>
           <a:p>
             <a:r>
+              <a:rPr lang="en-US"/>
               <a:t>Revision History</a:t>
             </a:r>
+            <a:endParaRPr lang="en-IN"/>
           </a:p>
         </p:txBody>
       </p:sp>

</xml_diff>